<commit_message>
started adding liturgy overview
</commit_message>
<xml_diff>
--- a/src/main/resources/Presentation.pptx
+++ b/src/main/resources/Presentation.pptx
@@ -235,7 +235,7 @@
               <a:pPr>
                 <a:defRPr/>
               </a:pPr>
-              <a:t>20/12/2014</a:t>
+              <a:t>24/12/2014</a:t>
             </a:fld>
             <a:endParaRPr lang="en-GB"/>
           </a:p>
@@ -319,7 +319,7 @@
     </p:spTree>
     <p:extLst>
       <p:ext uri="{BB962C8B-B14F-4D97-AF65-F5344CB8AC3E}">
-        <p14:creationId xmlns:p14="http://schemas.microsoft.com/office/powerpoint/2010/main" val="2562165451"/>
+        <p14:creationId xmlns:p14="http://schemas.microsoft.com/office/powerpoint/2010/main" xmlns="" val="2562165451"/>
       </p:ext>
     </p:extLst>
   </p:cSld>
@@ -418,7 +418,7 @@
               <a:pPr>
                 <a:defRPr/>
               </a:pPr>
-              <a:t>20-12-2014</a:t>
+              <a:t>24-12-2014</a:t>
             </a:fld>
             <a:endParaRPr lang="nl-NL"/>
           </a:p>
@@ -598,7 +598,7 @@
     </p:spTree>
     <p:extLst>
       <p:ext uri="{BB962C8B-B14F-4D97-AF65-F5344CB8AC3E}">
-        <p14:creationId xmlns:p14="http://schemas.microsoft.com/office/powerpoint/2010/main" val="4277614354"/>
+        <p14:creationId xmlns:p14="http://schemas.microsoft.com/office/powerpoint/2010/main" xmlns="" val="4277614354"/>
       </p:ext>
     </p:extLst>
   </p:cSld>
@@ -1136,7 +1136,7 @@
           <p:nvPr/>
         </p:nvPicPr>
         <p:blipFill>
-          <a:blip r:embed="rId2"/>
+          <a:blip r:embed="rId2" cstate="print"/>
           <a:srcRect/>
           <a:stretch>
             <a:fillRect/>
@@ -1201,7 +1201,7 @@
           <p:nvPr/>
         </p:nvPicPr>
         <p:blipFill>
-          <a:blip r:embed="rId2"/>
+          <a:blip r:embed="rId2" cstate="print"/>
           <a:srcRect/>
           <a:stretch>
             <a:fillRect/>
@@ -1266,7 +1266,7 @@
           <p:nvPr/>
         </p:nvPicPr>
         <p:blipFill>
-          <a:blip r:embed="rId2"/>
+          <a:blip r:embed="rId2" cstate="print"/>
           <a:srcRect/>
           <a:stretch>
             <a:fillRect/>
@@ -1331,7 +1331,7 @@
           <p:nvPr/>
         </p:nvPicPr>
         <p:blipFill>
-          <a:blip r:embed="rId2"/>
+          <a:blip r:embed="rId2" cstate="print"/>
           <a:srcRect/>
           <a:stretch>
             <a:fillRect/>
@@ -1391,7 +1391,7 @@
           <p:nvPr/>
         </p:nvPicPr>
         <p:blipFill>
-          <a:blip r:embed="rId2"/>
+          <a:blip r:embed="rId2" cstate="print"/>
           <a:stretch>
             <a:fillRect/>
           </a:stretch>
@@ -1450,7 +1450,7 @@
           <p:nvPr/>
         </p:nvPicPr>
         <p:blipFill>
-          <a:blip r:embed="rId2"/>
+          <a:blip r:embed="rId2" cstate="print"/>
           <a:stretch>
             <a:fillRect/>
           </a:stretch>
@@ -1509,7 +1509,7 @@
           <p:nvPr/>
         </p:nvPicPr>
         <p:blipFill>
-          <a:blip r:embed="rId2"/>
+          <a:blip r:embed="rId2" cstate="print"/>
           <a:stretch>
             <a:fillRect/>
           </a:stretch>
@@ -1568,7 +1568,7 @@
           <p:nvPr/>
         </p:nvPicPr>
         <p:blipFill>
-          <a:blip r:embed="rId2"/>
+          <a:blip r:embed="rId2" cstate="print"/>
           <a:srcRect/>
           <a:stretch>
             <a:fillRect/>
@@ -1739,7 +1739,7 @@
               <a:pPr>
                 <a:defRPr/>
               </a:pPr>
-              <a:t>20/12/2014</a:t>
+              <a:t>24/12/2014</a:t>
             </a:fld>
             <a:endParaRPr lang="en-GB"/>
           </a:p>
@@ -1964,6 +1964,123 @@
 </file>
 
 <file path=ppt/slideLayouts/slideLayout20.xml><?xml version="1.0" encoding="utf-8"?>
+<p:sldLayout xmlns:a="http://schemas.openxmlformats.org/drawingml/2006/main" xmlns:r="http://schemas.openxmlformats.org/officeDocument/2006/relationships" xmlns:p="http://schemas.openxmlformats.org/presentationml/2006/main" preserve="1" userDrawn="1">
+  <p:cSld name="Liturgie">
+    <p:spTree>
+      <p:nvGrpSpPr>
+        <p:cNvPr id="1" name=""/>
+        <p:cNvGrpSpPr/>
+        <p:nvPr/>
+      </p:nvGrpSpPr>
+      <p:grpSpPr>
+        <a:xfrm>
+          <a:off x="0" y="0"/>
+          <a:ext cx="0" cy="0"/>
+          <a:chOff x="0" y="0"/>
+          <a:chExt cx="0" cy="0"/>
+        </a:xfrm>
+      </p:grpSpPr>
+      <p:sp>
+        <p:nvSpPr>
+          <p:cNvPr id="5" name="Text Placeholder 4"/>
+          <p:cNvSpPr>
+            <a:spLocks noGrp="1"/>
+          </p:cNvSpPr>
+          <p:nvPr>
+            <p:ph type="body" sz="quarter" idx="10"/>
+          </p:nvPr>
+        </p:nvSpPr>
+        <p:spPr>
+          <a:xfrm>
+            <a:off x="0" y="1239715"/>
+            <a:ext cx="9144000" cy="5365271"/>
+          </a:xfrm>
+          <a:prstGeom prst="rect">
+            <a:avLst/>
+          </a:prstGeom>
+        </p:spPr>
+        <p:txBody>
+          <a:bodyPr lIns="720000" tIns="72000" rIns="252000" bIns="360000"/>
+          <a:lstStyle>
+            <a:lvl1pPr marL="0" indent="0">
+              <a:buNone/>
+              <a:defRPr sz="2800" baseline="0">
+                <a:effectLst>
+                  <a:outerShdw blurRad="63500" dist="38100" algn="ctr" rotWithShape="0">
+                    <a:schemeClr val="bg1">
+                      <a:alpha val="70000"/>
+                    </a:schemeClr>
+                  </a:outerShdw>
+                </a:effectLst>
+              </a:defRPr>
+            </a:lvl1pPr>
+          </a:lstStyle>
+          <a:p>
+            <a:pPr lvl="0"/>
+            <a:r>
+              <a:rPr lang="en-US" smtClean="0"/>
+              <a:t>Click to edit Master text styles</a:t>
+            </a:r>
+          </a:p>
+        </p:txBody>
+      </p:sp>
+      <p:sp>
+        <p:nvSpPr>
+          <p:cNvPr id="3" name="Text Placeholder 4"/>
+          <p:cNvSpPr>
+            <a:spLocks noGrp="1"/>
+          </p:cNvSpPr>
+          <p:nvPr>
+            <p:ph type="body" sz="quarter" idx="11"/>
+          </p:nvPr>
+        </p:nvSpPr>
+        <p:spPr>
+          <a:xfrm>
+            <a:off x="0" y="0"/>
+            <a:ext cx="6444208" cy="1186962"/>
+          </a:xfrm>
+          <a:prstGeom prst="rect">
+            <a:avLst/>
+          </a:prstGeom>
+        </p:spPr>
+        <p:txBody>
+          <a:bodyPr lIns="180000" tIns="0" bIns="360000" anchor="b" anchorCtr="0"/>
+          <a:lstStyle>
+            <a:lvl1pPr marL="0" indent="0">
+              <a:buNone/>
+              <a:defRPr sz="3000" baseline="0">
+                <a:effectLst>
+                  <a:outerShdw blurRad="63500" dist="38100" algn="tl" rotWithShape="0">
+                    <a:schemeClr val="bg1">
+                      <a:alpha val="70000"/>
+                    </a:schemeClr>
+                  </a:outerShdw>
+                </a:effectLst>
+                <a:latin typeface="+mj-lt"/>
+              </a:defRPr>
+            </a:lvl1pPr>
+          </a:lstStyle>
+          <a:p>
+            <a:pPr lvl="0"/>
+            <a:r>
+              <a:rPr lang="en-US" smtClean="0"/>
+              <a:t>Click to edit Master text styles</a:t>
+            </a:r>
+          </a:p>
+        </p:txBody>
+      </p:sp>
+    </p:spTree>
+  </p:cSld>
+  <p:clrMapOvr>
+    <a:masterClrMapping/>
+  </p:clrMapOvr>
+  <p:transition>
+    <p:fade/>
+  </p:transition>
+</p:sldLayout>
+</file>
+
+<file path=ppt/slideLayouts/slideLayout21.xml><?xml version="1.0" encoding="utf-8"?>
 <p:sldLayout xmlns:a="http://schemas.openxmlformats.org/drawingml/2006/main" xmlns:r="http://schemas.openxmlformats.org/officeDocument/2006/relationships" xmlns:p="http://schemas.openxmlformats.org/presentationml/2006/main" userDrawn="1">
   <p:cSld name="Object">
     <p:spTree>
@@ -2050,7 +2167,7 @@
     </p:spTree>
     <p:extLst>
       <p:ext uri="{BB962C8B-B14F-4D97-AF65-F5344CB8AC3E}">
-        <p14:creationId xmlns:p14="http://schemas.microsoft.com/office/powerpoint/2010/main" val="407480130"/>
+        <p14:creationId xmlns:p14="http://schemas.microsoft.com/office/powerpoint/2010/main" xmlns="" val="407480130"/>
       </p:ext>
     </p:extLst>
   </p:cSld>
@@ -2087,7 +2204,7 @@
           <p:nvPr/>
         </p:nvPicPr>
         <p:blipFill>
-          <a:blip r:embed="rId2"/>
+          <a:blip r:embed="rId2" cstate="print"/>
           <a:srcRect b="45238"/>
           <a:stretch>
             <a:fillRect/>
@@ -2119,7 +2236,7 @@
           <p:nvPr/>
         </p:nvPicPr>
         <p:blipFill>
-          <a:blip r:embed="rId2"/>
+          <a:blip r:embed="rId2" cstate="print"/>
           <a:srcRect l="77359" t="29018" r="943" b="45238"/>
           <a:stretch>
             <a:fillRect/>
@@ -2634,7 +2751,7 @@
           <p:nvPr/>
         </p:nvPicPr>
         <p:blipFill>
-          <a:blip r:embed="rId2"/>
+          <a:blip r:embed="rId2" cstate="print"/>
           <a:srcRect r="74409" b="79784"/>
           <a:stretch>
             <a:fillRect/>
@@ -3104,7 +3221,7 @@
           <p:nvPr/>
         </p:nvPicPr>
         <p:blipFill>
-          <a:blip r:embed="rId3"/>
+          <a:blip r:embed="rId3" cstate="print"/>
           <a:srcRect/>
           <a:stretch>
             <a:fillRect/>
@@ -3704,7 +3821,7 @@
           <p:nvPr/>
         </p:nvPicPr>
         <p:blipFill>
-          <a:blip r:embed="rId3"/>
+          <a:blip r:embed="rId3" cstate="print"/>
           <a:srcRect/>
           <a:stretch>
             <a:fillRect/>
@@ -3894,7 +4011,7 @@
           <p:nvPr/>
         </p:nvPicPr>
         <p:blipFill>
-          <a:blip r:embed="rId2"/>
+          <a:blip r:embed="rId2" cstate="print"/>
           <a:srcRect l="9837" t="15523" b="33356"/>
           <a:stretch>
             <a:fillRect/>
@@ -4407,7 +4524,7 @@
           <p:nvPr/>
         </p:nvPicPr>
         <p:blipFill>
-          <a:blip r:embed="rId22" cstate="print">
+          <a:blip r:embed="rId23" cstate="print">
             <a:extLst/>
           </a:blip>
           <a:srcRect l="50000" b="58519"/>
@@ -4456,7 +4573,8 @@
     <p:sldLayoutId id="2147484230" r:id="rId17"/>
     <p:sldLayoutId id="2147484231" r:id="rId18"/>
     <p:sldLayoutId id="2147484232" r:id="rId19"/>
-    <p:sldLayoutId id="2147484295" r:id="rId20"/>
+    <p:sldLayoutId id="2147484296" r:id="rId20"/>
+    <p:sldLayoutId id="2147484295" r:id="rId21"/>
   </p:sldLayoutIdLst>
   <p:transition>
     <p:fade/>
@@ -4867,29 +4985,10 @@
           <a:chExt cx="0" cy="0"/>
         </a:xfrm>
       </p:grpSpPr>
-      <p:sp>
-        <p:nvSpPr>
-          <p:cNvPr id="2" name="Text Placeholder 1"/>
-          <p:cNvSpPr>
-            <a:spLocks noGrp="1"/>
-          </p:cNvSpPr>
-          <p:nvPr>
-            <p:ph type="body" sz="quarter" idx="10"/>
-          </p:nvPr>
-        </p:nvSpPr>
-        <p:spPr/>
-        <p:txBody>
-          <a:bodyPr/>
-          <a:lstStyle/>
-          <a:p>
-            <a:endParaRPr lang="nl-NL" dirty="0"/>
-          </a:p>
-        </p:txBody>
-      </p:sp>
     </p:spTree>
     <p:extLst>
       <p:ext uri="{BB962C8B-B14F-4D97-AF65-F5344CB8AC3E}">
-        <p14:creationId xmlns:p14="http://schemas.microsoft.com/office/powerpoint/2010/main" val="1735715938"/>
+        <p14:creationId xmlns:p14="http://schemas.microsoft.com/office/powerpoint/2010/main" xmlns="" val="1735715938"/>
       </p:ext>
     </p:extLst>
   </p:cSld>

</xml_diff>

<commit_message>
fixed black values in template
</commit_message>
<xml_diff>
--- a/src/main/resources/Presentation.pptx
+++ b/src/main/resources/Presentation.pptx
@@ -235,7 +235,7 @@
               <a:pPr>
                 <a:defRPr/>
               </a:pPr>
-              <a:t>25/12/2014</a:t>
+              <a:t>30/12/2014</a:t>
             </a:fld>
             <a:endParaRPr lang="en-GB"/>
           </a:p>
@@ -319,7 +319,7 @@
     </p:spTree>
     <p:extLst>
       <p:ext uri="{BB962C8B-B14F-4D97-AF65-F5344CB8AC3E}">
-        <p14:creationId xmlns="" xmlns:p14="http://schemas.microsoft.com/office/powerpoint/2010/main" val="2562165451"/>
+        <p14:creationId xmlns:p14="http://schemas.microsoft.com/office/powerpoint/2010/main" xmlns="" val="2562165451"/>
       </p:ext>
     </p:extLst>
   </p:cSld>
@@ -418,7 +418,7 @@
               <a:pPr>
                 <a:defRPr/>
               </a:pPr>
-              <a:t>25-12-2014</a:t>
+              <a:t>30-12-2014</a:t>
             </a:fld>
             <a:endParaRPr lang="nl-NL"/>
           </a:p>
@@ -598,7 +598,7 @@
     </p:spTree>
     <p:extLst>
       <p:ext uri="{BB962C8B-B14F-4D97-AF65-F5344CB8AC3E}">
-        <p14:creationId xmlns="" xmlns:p14="http://schemas.microsoft.com/office/powerpoint/2010/main" val="4277614354"/>
+        <p14:creationId xmlns:p14="http://schemas.microsoft.com/office/powerpoint/2010/main" xmlns="" val="4277614354"/>
       </p:ext>
     </p:extLst>
   </p:cSld>
@@ -784,15 +784,11 @@
             </a:pPr>
             <a:endParaRPr lang="nl-NL" sz="2800" dirty="0">
               <a:solidFill>
-                <a:schemeClr val="bg1"/>
+                <a:schemeClr val="tx1">
+                  <a:lumMod val="95000"/>
+                </a:schemeClr>
               </a:solidFill>
-              <a:effectLst>
-                <a:outerShdw blurRad="38100" dist="38100" dir="2700000" algn="tl">
-                  <a:srgbClr val="000000">
-                    <a:alpha val="43137"/>
-                  </a:srgbClr>
-                </a:outerShdw>
-              </a:effectLst>
+              <a:effectLst/>
               <a:ea typeface="+mj-ea"/>
               <a:cs typeface="Tahoma" pitchFamily="34" charset="0"/>
             </a:endParaRPr>
@@ -809,15 +805,11 @@
             </a:pPr>
             <a:endParaRPr lang="nl-NL" sz="2800" dirty="0">
               <a:solidFill>
-                <a:schemeClr val="bg1"/>
+                <a:schemeClr val="tx1">
+                  <a:lumMod val="95000"/>
+                </a:schemeClr>
               </a:solidFill>
-              <a:effectLst>
-                <a:outerShdw blurRad="38100" dist="38100" dir="2700000" algn="tl">
-                  <a:srgbClr val="000000">
-                    <a:alpha val="43137"/>
-                  </a:srgbClr>
-                </a:outerShdw>
-              </a:effectLst>
+              <a:effectLst/>
               <a:ea typeface="+mj-ea"/>
               <a:cs typeface="Tahoma" pitchFamily="34" charset="0"/>
             </a:endParaRPr>
@@ -834,15 +826,11 @@
             </a:pPr>
             <a:endParaRPr lang="nl-NL" sz="2800" dirty="0">
               <a:solidFill>
-                <a:schemeClr val="bg1"/>
+                <a:schemeClr val="tx1">
+                  <a:lumMod val="95000"/>
+                </a:schemeClr>
               </a:solidFill>
-              <a:effectLst>
-                <a:outerShdw blurRad="38100" dist="38100" dir="2700000" algn="tl">
-                  <a:srgbClr val="000000">
-                    <a:alpha val="43137"/>
-                  </a:srgbClr>
-                </a:outerShdw>
-              </a:effectLst>
+              <a:effectLst/>
               <a:ea typeface="+mj-ea"/>
               <a:cs typeface="Tahoma" pitchFamily="34" charset="0"/>
             </a:endParaRPr>
@@ -859,15 +847,11 @@
             </a:pPr>
             <a:endParaRPr lang="nl-NL" sz="2800" dirty="0">
               <a:solidFill>
-                <a:schemeClr val="bg1"/>
+                <a:schemeClr val="tx1">
+                  <a:lumMod val="95000"/>
+                </a:schemeClr>
               </a:solidFill>
-              <a:effectLst>
-                <a:outerShdw blurRad="38100" dist="38100" dir="2700000" algn="tl">
-                  <a:srgbClr val="000000">
-                    <a:alpha val="43137"/>
-                  </a:srgbClr>
-                </a:outerShdw>
-              </a:effectLst>
+              <a:effectLst/>
               <a:ea typeface="+mj-ea"/>
               <a:cs typeface="Tahoma" pitchFamily="34" charset="0"/>
             </a:endParaRPr>
@@ -885,15 +869,11 @@
             <a:r>
               <a:rPr lang="nl-NL" sz="2800" dirty="0">
                 <a:solidFill>
-                  <a:schemeClr val="bg1"/>
+                  <a:schemeClr val="tx1">
+                    <a:lumMod val="95000"/>
+                  </a:schemeClr>
                 </a:solidFill>
-                <a:effectLst>
-                  <a:outerShdw blurRad="63500" dist="38100" algn="tl" rotWithShape="0">
-                    <a:schemeClr val="bg1">
-                      <a:alpha val="70000"/>
-                    </a:schemeClr>
-                  </a:outerShdw>
-                </a:effectLst>
+                <a:effectLst/>
                 <a:ea typeface="+mj-ea"/>
                 <a:cs typeface="Tahoma" pitchFamily="34" charset="0"/>
               </a:rPr>
@@ -902,15 +882,11 @@
             <a:br>
               <a:rPr lang="nl-NL" sz="2800" dirty="0">
                 <a:solidFill>
-                  <a:schemeClr val="bg1"/>
+                  <a:schemeClr val="tx1">
+                    <a:lumMod val="95000"/>
+                  </a:schemeClr>
                 </a:solidFill>
-                <a:effectLst>
-                  <a:outerShdw blurRad="63500" dist="38100" algn="tl" rotWithShape="0">
-                    <a:schemeClr val="bg1">
-                      <a:alpha val="70000"/>
-                    </a:schemeClr>
-                  </a:outerShdw>
-                </a:effectLst>
+                <a:effectLst/>
                 <a:ea typeface="+mj-ea"/>
                 <a:cs typeface="Tahoma" pitchFamily="34" charset="0"/>
               </a:rPr>
@@ -918,15 +894,11 @@
             <a:r>
               <a:rPr lang="nl-NL" sz="2800" dirty="0">
                 <a:solidFill>
-                  <a:schemeClr val="bg1"/>
+                  <a:schemeClr val="tx1">
+                    <a:lumMod val="95000"/>
+                  </a:schemeClr>
                 </a:solidFill>
-                <a:effectLst>
-                  <a:outerShdw blurRad="63500" dist="38100" algn="tl" rotWithShape="0">
-                    <a:schemeClr val="bg1">
-                      <a:alpha val="70000"/>
-                    </a:schemeClr>
-                  </a:outerShdw>
-                </a:effectLst>
+                <a:effectLst/>
                 <a:ea typeface="+mj-ea"/>
                 <a:cs typeface="Tahoma" pitchFamily="34" charset="0"/>
               </a:rPr>
@@ -935,30 +907,22 @@
             <a:br>
               <a:rPr lang="nl-NL" sz="2800" dirty="0">
                 <a:solidFill>
-                  <a:schemeClr val="bg1"/>
+                  <a:schemeClr val="tx1">
+                    <a:lumMod val="95000"/>
+                  </a:schemeClr>
                 </a:solidFill>
-                <a:effectLst>
-                  <a:outerShdw blurRad="63500" dist="38100" algn="tl" rotWithShape="0">
-                    <a:schemeClr val="bg1">
-                      <a:alpha val="70000"/>
-                    </a:schemeClr>
-                  </a:outerShdw>
-                </a:effectLst>
+                <a:effectLst/>
                 <a:ea typeface="+mj-ea"/>
                 <a:cs typeface="Tahoma" pitchFamily="34" charset="0"/>
               </a:rPr>
             </a:br>
             <a:endParaRPr lang="nl-NL" sz="2800" dirty="0">
               <a:solidFill>
-                <a:schemeClr val="bg1"/>
+                <a:schemeClr val="tx1">
+                  <a:lumMod val="95000"/>
+                </a:schemeClr>
               </a:solidFill>
-              <a:effectLst>
-                <a:outerShdw blurRad="63500" dist="38100" algn="tl" rotWithShape="0">
-                  <a:schemeClr val="bg1">
-                    <a:alpha val="70000"/>
-                  </a:schemeClr>
-                </a:outerShdw>
-              </a:effectLst>
+              <a:effectLst/>
               <a:ea typeface="+mj-ea"/>
               <a:cs typeface="Tahoma" pitchFamily="34" charset="0"/>
             </a:endParaRPr>
@@ -976,15 +940,11 @@
             <a:r>
               <a:rPr lang="nl-NL" sz="2800" dirty="0">
                 <a:solidFill>
-                  <a:schemeClr val="bg1"/>
+                  <a:schemeClr val="tx1">
+                    <a:lumMod val="95000"/>
+                  </a:schemeClr>
                 </a:solidFill>
-                <a:effectLst>
-                  <a:outerShdw blurRad="63500" dist="38100" algn="tl" rotWithShape="0">
-                    <a:schemeClr val="bg1">
-                      <a:alpha val="70000"/>
-                    </a:schemeClr>
-                  </a:outerShdw>
-                </a:effectLst>
+                <a:effectLst/>
                 <a:ea typeface="+mj-ea"/>
                 <a:cs typeface="Tahoma" pitchFamily="34" charset="0"/>
               </a:rPr>
@@ -1739,7 +1699,7 @@
               <a:pPr>
                 <a:defRPr/>
               </a:pPr>
-              <a:t>25/12/2014</a:t>
+              <a:t>30/12/2014</a:t>
             </a:fld>
             <a:endParaRPr lang="en-GB"/>
           </a:p>
@@ -1901,30 +1861,22 @@
             <a:r>
               <a:rPr lang="nl-NL" sz="3200" dirty="0">
                 <a:solidFill>
-                  <a:schemeClr val="bg1"/>
+                  <a:schemeClr val="tx1">
+                    <a:lumMod val="95000"/>
+                  </a:schemeClr>
                 </a:solidFill>
-                <a:effectLst>
-                  <a:outerShdw blurRad="63500" dist="38100" algn="tl" rotWithShape="0">
-                    <a:schemeClr val="bg1">
-                      <a:alpha val="70000"/>
-                    </a:schemeClr>
-                  </a:outerShdw>
-                </a:effectLst>
+                <a:effectLst/>
                 <a:cs typeface="Tahoma" pitchFamily="34" charset="0"/>
               </a:rPr>
               <a:t>Agenda Assen-Peelo</a:t>
             </a:r>
             <a:endParaRPr lang="en-GB" sz="3000" dirty="0">
               <a:solidFill>
-                <a:schemeClr val="bg1"/>
+                <a:schemeClr val="tx1">
+                  <a:lumMod val="95000"/>
+                </a:schemeClr>
               </a:solidFill>
-              <a:effectLst>
-                <a:outerShdw blurRad="38100" dist="38100" dir="2700000" algn="tl">
-                  <a:srgbClr val="000000">
-                    <a:alpha val="43137"/>
-                  </a:srgbClr>
-                </a:outerShdw>
-              </a:effectLst>
+              <a:effectLst/>
               <a:cs typeface="Tahoma" pitchFamily="34" charset="0"/>
             </a:endParaRPr>
           </a:p>
@@ -1937,15 +1889,11 @@
             </a:pPr>
             <a:endParaRPr lang="en-GB" sz="2800" dirty="0">
               <a:solidFill>
-                <a:schemeClr val="bg1"/>
+                <a:schemeClr val="tx1">
+                  <a:lumMod val="95000"/>
+                </a:schemeClr>
               </a:solidFill>
-              <a:effectLst>
-                <a:outerShdw blurRad="38100" dist="38100" dir="2700000" algn="tl">
-                  <a:srgbClr val="000000">
-                    <a:alpha val="43137"/>
-                  </a:srgbClr>
-                </a:outerShdw>
-              </a:effectLst>
+              <a:effectLst/>
               <a:ea typeface="+mj-ea"/>
               <a:cs typeface="Tahoma" pitchFamily="34" charset="0"/>
             </a:endParaRPr>
@@ -2167,7 +2115,7 @@
     </p:spTree>
     <p:extLst>
       <p:ext uri="{BB962C8B-B14F-4D97-AF65-F5344CB8AC3E}">
-        <p14:creationId xmlns="" xmlns:p14="http://schemas.microsoft.com/office/powerpoint/2010/main" val="407480130"/>
+        <p14:creationId xmlns:p14="http://schemas.microsoft.com/office/powerpoint/2010/main" xmlns="" val="407480130"/>
       </p:ext>
     </p:extLst>
   </p:cSld>
@@ -2603,15 +2551,11 @@
             <a:r>
               <a:rPr lang="nl-NL" sz="2800" dirty="0">
                 <a:solidFill>
-                  <a:schemeClr val="bg1"/>
+                  <a:schemeClr val="tx1">
+                    <a:lumMod val="95000"/>
+                  </a:schemeClr>
                 </a:solidFill>
-                <a:effectLst>
-                  <a:outerShdw blurRad="63500" dist="38100" algn="tl" rotWithShape="0">
-                    <a:schemeClr val="bg1">
-                      <a:alpha val="70000"/>
-                    </a:schemeClr>
-                  </a:outerShdw>
-                </a:effectLst>
+                <a:effectLst/>
                 <a:latin typeface="+mn-lt"/>
                 <a:cs typeface="Arial" pitchFamily="34" charset="0"/>
               </a:rPr>
@@ -2620,15 +2564,11 @@
             <a:r>
               <a:rPr lang="nl-NL" sz="2800" baseline="30000" dirty="0">
                 <a:solidFill>
-                  <a:schemeClr val="bg1"/>
+                  <a:schemeClr val="tx1">
+                    <a:lumMod val="95000"/>
+                  </a:schemeClr>
                 </a:solidFill>
-                <a:effectLst>
-                  <a:outerShdw blurRad="63500" dist="38100" algn="tl" rotWithShape="0">
-                    <a:schemeClr val="bg1">
-                      <a:alpha val="70000"/>
-                    </a:schemeClr>
-                  </a:outerShdw>
-                </a:effectLst>
+                <a:effectLst/>
                 <a:latin typeface="+mn-lt"/>
                 <a:cs typeface="Arial" pitchFamily="34" charset="0"/>
               </a:rPr>
@@ -2637,15 +2577,11 @@
             <a:r>
               <a:rPr lang="nl-NL" sz="2800" dirty="0">
                 <a:solidFill>
-                  <a:schemeClr val="bg1"/>
+                  <a:schemeClr val="tx1">
+                    <a:lumMod val="95000"/>
+                  </a:schemeClr>
                 </a:solidFill>
-                <a:effectLst>
-                  <a:outerShdw blurRad="63500" dist="38100" algn="tl" rotWithShape="0">
-                    <a:schemeClr val="bg1">
-                      <a:alpha val="70000"/>
-                    </a:schemeClr>
-                  </a:outerShdw>
-                </a:effectLst>
+                <a:effectLst/>
                 <a:latin typeface="+mn-lt"/>
                 <a:cs typeface="Arial" pitchFamily="34" charset="0"/>
               </a:rPr>
@@ -2685,15 +2621,11 @@
             <a:r>
               <a:rPr lang="nl-NL" sz="2800" dirty="0">
                 <a:solidFill>
-                  <a:schemeClr val="bg1"/>
+                  <a:schemeClr val="tx1">
+                    <a:lumMod val="95000"/>
+                  </a:schemeClr>
                 </a:solidFill>
-                <a:effectLst>
-                  <a:outerShdw blurRad="63500" dist="38100" algn="tl" rotWithShape="0">
-                    <a:schemeClr val="bg1">
-                      <a:alpha val="70000"/>
-                    </a:schemeClr>
-                  </a:outerShdw>
-                </a:effectLst>
+                <a:effectLst/>
                 <a:cs typeface="Arial" pitchFamily="34" charset="0"/>
               </a:rPr>
               <a:t>2</a:t>
@@ -2701,15 +2633,11 @@
             <a:r>
               <a:rPr lang="nl-NL" sz="2800" baseline="30000" dirty="0">
                 <a:solidFill>
-                  <a:schemeClr val="bg1"/>
+                  <a:schemeClr val="tx1">
+                    <a:lumMod val="95000"/>
+                  </a:schemeClr>
                 </a:solidFill>
-                <a:effectLst>
-                  <a:outerShdw blurRad="63500" dist="38100" algn="tl" rotWithShape="0">
-                    <a:schemeClr val="bg1">
-                      <a:alpha val="70000"/>
-                    </a:schemeClr>
-                  </a:outerShdw>
-                </a:effectLst>
+                <a:effectLst/>
                 <a:cs typeface="Arial" pitchFamily="34" charset="0"/>
               </a:rPr>
               <a:t>e</a:t>
@@ -2717,27 +2645,22 @@
             <a:r>
               <a:rPr lang="nl-NL" sz="2800" dirty="0">
                 <a:solidFill>
-                  <a:schemeClr val="bg1"/>
+                  <a:schemeClr val="tx1">
+                    <a:lumMod val="95000"/>
+                  </a:schemeClr>
                 </a:solidFill>
-                <a:effectLst>
-                  <a:outerShdw blurRad="63500" dist="38100" algn="tl" rotWithShape="0">
-                    <a:schemeClr val="bg1">
-                      <a:alpha val="70000"/>
-                    </a:schemeClr>
-                  </a:outerShdw>
-                </a:effectLst>
+                <a:effectLst/>
                 <a:cs typeface="Arial" pitchFamily="34" charset="0"/>
               </a:rPr>
               <a:t>  collecte:</a:t>
             </a:r>
             <a:endParaRPr lang="en-GB" sz="2800" dirty="0">
-              <a:effectLst>
-                <a:outerShdw blurRad="63500" dist="38100" algn="tl" rotWithShape="0">
-                  <a:schemeClr val="bg1">
-                    <a:alpha val="70000"/>
-                  </a:schemeClr>
-                </a:outerShdw>
-              </a:effectLst>
+              <a:solidFill>
+                <a:schemeClr val="tx1">
+                  <a:lumMod val="95000"/>
+                </a:schemeClr>
+              </a:solidFill>
+              <a:effectLst/>
             </a:endParaRPr>
           </a:p>
         </p:txBody>
@@ -2954,15 +2877,11 @@
             </a:pPr>
             <a:endParaRPr lang="nl-NL" sz="2800" dirty="0">
               <a:solidFill>
-                <a:schemeClr val="bg1"/>
+                <a:schemeClr val="tx1">
+                  <a:lumMod val="95000"/>
+                </a:schemeClr>
               </a:solidFill>
-              <a:effectLst>
-                <a:outerShdw blurRad="63500" dist="38100" algn="tl">
-                  <a:schemeClr val="bg1">
-                    <a:alpha val="70000"/>
-                  </a:schemeClr>
-                </a:outerShdw>
-              </a:effectLst>
+              <a:effectLst/>
               <a:latin typeface="+mn-lt"/>
               <a:cs typeface="Arial" pitchFamily="34" charset="0"/>
             </a:endParaRPr>
@@ -2980,15 +2899,11 @@
             <a:r>
               <a:rPr lang="nl-NL" sz="2600" dirty="0">
                 <a:solidFill>
-                  <a:schemeClr val="bg1"/>
+                  <a:schemeClr val="tx1">
+                    <a:lumMod val="95000"/>
+                  </a:schemeClr>
                 </a:solidFill>
-                <a:effectLst>
-                  <a:outerShdw blurRad="63500" dist="38100" algn="tl">
-                    <a:schemeClr val="bg1">
-                      <a:alpha val="70000"/>
-                    </a:schemeClr>
-                  </a:outerShdw>
-                </a:effectLst>
+                <a:effectLst/>
                 <a:latin typeface="+mn-lt"/>
                 <a:cs typeface="Arial" pitchFamily="34" charset="0"/>
               </a:rPr>
@@ -3008,15 +2923,11 @@
             <a:r>
               <a:rPr lang="nl-NL" sz="2600" dirty="0">
                 <a:solidFill>
-                  <a:schemeClr val="bg1"/>
+                  <a:schemeClr val="tx1">
+                    <a:lumMod val="95000"/>
+                  </a:schemeClr>
                 </a:solidFill>
-                <a:effectLst>
-                  <a:outerShdw blurRad="63500" dist="38100" algn="tl">
-                    <a:schemeClr val="bg1">
-                      <a:alpha val="70000"/>
-                    </a:schemeClr>
-                  </a:outerShdw>
-                </a:effectLst>
+                <a:effectLst/>
                 <a:latin typeface="+mn-lt"/>
                 <a:cs typeface="Arial" pitchFamily="34" charset="0"/>
               </a:rPr>
@@ -3035,15 +2946,11 @@
             </a:pPr>
             <a:endParaRPr lang="nl-NL" sz="2600" dirty="0">
               <a:solidFill>
-                <a:schemeClr val="bg1"/>
+                <a:schemeClr val="tx1">
+                  <a:lumMod val="95000"/>
+                </a:schemeClr>
               </a:solidFill>
-              <a:effectLst>
-                <a:outerShdw blurRad="63500" dist="38100" algn="tl">
-                  <a:schemeClr val="bg1">
-                    <a:alpha val="70000"/>
-                  </a:schemeClr>
-                </a:outerShdw>
-              </a:effectLst>
+              <a:effectLst/>
               <a:latin typeface="+mn-lt"/>
               <a:cs typeface="Arial" pitchFamily="34" charset="0"/>
             </a:endParaRPr>
@@ -3061,15 +2968,11 @@
             <a:r>
               <a:rPr lang="nl-NL" sz="2600" dirty="0">
                 <a:solidFill>
-                  <a:schemeClr val="bg1"/>
+                  <a:schemeClr val="tx1">
+                    <a:lumMod val="95000"/>
+                  </a:schemeClr>
                 </a:solidFill>
-                <a:effectLst>
-                  <a:outerShdw blurRad="63500" dist="38100" algn="tl">
-                    <a:schemeClr val="bg1">
-                      <a:alpha val="70000"/>
-                    </a:schemeClr>
-                  </a:outerShdw>
-                </a:effectLst>
+                <a:effectLst/>
                 <a:latin typeface="+mn-lt"/>
                 <a:cs typeface="Arial" pitchFamily="34" charset="0"/>
               </a:rPr>
@@ -3089,15 +2992,11 @@
             <a:r>
               <a:rPr lang="nl-NL" sz="2600" dirty="0">
                 <a:solidFill>
-                  <a:schemeClr val="bg1"/>
+                  <a:schemeClr val="tx1">
+                    <a:lumMod val="95000"/>
+                  </a:schemeClr>
                 </a:solidFill>
-                <a:effectLst>
-                  <a:outerShdw blurRad="63500" dist="38100" algn="tl">
-                    <a:schemeClr val="bg1">
-                      <a:alpha val="70000"/>
-                    </a:schemeClr>
-                  </a:outerShdw>
-                </a:effectLst>
+                <a:effectLst/>
                 <a:latin typeface="+mn-lt"/>
                 <a:cs typeface="Arial" pitchFamily="34" charset="0"/>
               </a:rPr>
@@ -3116,15 +3015,11 @@
             </a:pPr>
             <a:endParaRPr lang="nl-NL" sz="2600" dirty="0">
               <a:solidFill>
-                <a:schemeClr val="bg1"/>
+                <a:schemeClr val="tx1">
+                  <a:lumMod val="95000"/>
+                </a:schemeClr>
               </a:solidFill>
-              <a:effectLst>
-                <a:outerShdw blurRad="63500" dist="38100" algn="tl">
-                  <a:schemeClr val="bg1">
-                    <a:alpha val="70000"/>
-                  </a:schemeClr>
-                </a:outerShdw>
-              </a:effectLst>
+              <a:effectLst/>
               <a:latin typeface="+mn-lt"/>
               <a:cs typeface="Arial" pitchFamily="34" charset="0"/>
             </a:endParaRPr>
@@ -3142,15 +3037,11 @@
             <a:r>
               <a:rPr lang="nl-NL" sz="2600" dirty="0">
                 <a:solidFill>
-                  <a:schemeClr val="bg1"/>
+                  <a:schemeClr val="tx1">
+                    <a:lumMod val="95000"/>
+                  </a:schemeClr>
                 </a:solidFill>
-                <a:effectLst>
-                  <a:outerShdw blurRad="63500" dist="38100" algn="tl">
-                    <a:schemeClr val="bg1">
-                      <a:alpha val="70000"/>
-                    </a:schemeClr>
-                  </a:outerShdw>
-                </a:effectLst>
+                <a:effectLst/>
                 <a:latin typeface="+mn-lt"/>
                 <a:cs typeface="Arial" pitchFamily="34" charset="0"/>
               </a:rPr>
@@ -3169,15 +3060,11 @@
             </a:pPr>
             <a:endParaRPr lang="nl-NL" sz="2600" dirty="0">
               <a:solidFill>
-                <a:schemeClr val="bg1"/>
+                <a:schemeClr val="tx1">
+                  <a:lumMod val="95000"/>
+                </a:schemeClr>
               </a:solidFill>
-              <a:effectLst>
-                <a:outerShdw blurRad="63500" dist="38100" algn="tl">
-                  <a:schemeClr val="bg1">
-                    <a:alpha val="70000"/>
-                  </a:schemeClr>
-                </a:outerShdw>
-              </a:effectLst>
+              <a:effectLst/>
               <a:latin typeface="+mn-lt"/>
               <a:cs typeface="Arial" pitchFamily="34" charset="0"/>
             </a:endParaRPr>
@@ -3195,15 +3082,11 @@
             <a:r>
               <a:rPr lang="nl-NL" sz="2600" dirty="0">
                 <a:solidFill>
-                  <a:schemeClr val="bg1"/>
+                  <a:schemeClr val="tx1">
+                    <a:lumMod val="95000"/>
+                  </a:schemeClr>
                 </a:solidFill>
-                <a:effectLst>
-                  <a:outerShdw blurRad="63500" dist="38100" algn="tl">
-                    <a:schemeClr val="bg1">
-                      <a:alpha val="70000"/>
-                    </a:schemeClr>
-                  </a:outerShdw>
-                </a:effectLst>
+                <a:effectLst/>
                 <a:latin typeface="+mn-lt"/>
                 <a:cs typeface="Arial" pitchFamily="34" charset="0"/>
               </a:rPr>
@@ -3478,15 +3361,11 @@
             </a:pPr>
             <a:endParaRPr lang="nl-NL" sz="2800" dirty="0">
               <a:solidFill>
-                <a:schemeClr val="bg1"/>
+                <a:schemeClr val="tx1">
+                  <a:lumMod val="95000"/>
+                </a:schemeClr>
               </a:solidFill>
-              <a:effectLst>
-                <a:outerShdw blurRad="38100" dist="38100" dir="2700000" algn="tl">
-                  <a:srgbClr val="000000">
-                    <a:alpha val="43137"/>
-                  </a:srgbClr>
-                </a:outerShdw>
-              </a:effectLst>
+              <a:effectLst/>
               <a:latin typeface="Arial" pitchFamily="34" charset="0"/>
               <a:cs typeface="Arial" pitchFamily="34" charset="0"/>
             </a:endParaRPr>
@@ -3503,15 +3382,11 @@
             </a:pPr>
             <a:endParaRPr lang="nl-NL" sz="2800" dirty="0">
               <a:solidFill>
-                <a:schemeClr val="bg1"/>
+                <a:schemeClr val="tx1">
+                  <a:lumMod val="95000"/>
+                </a:schemeClr>
               </a:solidFill>
-              <a:effectLst>
-                <a:outerShdw blurRad="38100" dist="38100" dir="2700000" algn="tl">
-                  <a:srgbClr val="000000">
-                    <a:alpha val="43137"/>
-                  </a:srgbClr>
-                </a:outerShdw>
-              </a:effectLst>
+              <a:effectLst/>
               <a:latin typeface="Arial" pitchFamily="34" charset="0"/>
               <a:cs typeface="Arial" pitchFamily="34" charset="0"/>
             </a:endParaRPr>
@@ -3528,15 +3403,11 @@
             </a:pPr>
             <a:endParaRPr lang="nl-NL" sz="2800" dirty="0">
               <a:solidFill>
-                <a:schemeClr val="bg1"/>
+                <a:schemeClr val="tx1">
+                  <a:lumMod val="95000"/>
+                </a:schemeClr>
               </a:solidFill>
-              <a:effectLst>
-                <a:outerShdw blurRad="38100" dist="38100" dir="2700000" algn="tl">
-                  <a:srgbClr val="000000">
-                    <a:alpha val="43137"/>
-                  </a:srgbClr>
-                </a:outerShdw>
-              </a:effectLst>
+              <a:effectLst/>
               <a:latin typeface="Arial" pitchFamily="34" charset="0"/>
               <a:cs typeface="Arial" pitchFamily="34" charset="0"/>
             </a:endParaRPr>
@@ -3554,15 +3425,11 @@
             <a:r>
               <a:rPr lang="nl-NL" sz="2600" dirty="0">
                 <a:solidFill>
-                  <a:schemeClr val="bg1"/>
+                  <a:schemeClr val="tx1">
+                    <a:lumMod val="95000"/>
+                  </a:schemeClr>
                 </a:solidFill>
-                <a:effectLst>
-                  <a:outerShdw blurRad="63500" dist="38100" algn="tl">
-                    <a:schemeClr val="bg1">
-                      <a:alpha val="70000"/>
-                    </a:schemeClr>
-                  </a:outerShdw>
-                </a:effectLst>
+                <a:effectLst/>
                 <a:latin typeface="Arial" pitchFamily="34" charset="0"/>
                 <a:cs typeface="Arial" pitchFamily="34" charset="0"/>
               </a:rPr>
@@ -3582,15 +3449,11 @@
             <a:r>
               <a:rPr lang="nl-NL" sz="2600" dirty="0">
                 <a:solidFill>
-                  <a:schemeClr val="bg1"/>
+                  <a:schemeClr val="tx1">
+                    <a:lumMod val="95000"/>
+                  </a:schemeClr>
                 </a:solidFill>
-                <a:effectLst>
-                  <a:outerShdw blurRad="63500" dist="38100" algn="tl">
-                    <a:schemeClr val="bg1">
-                      <a:alpha val="70000"/>
-                    </a:schemeClr>
-                  </a:outerShdw>
-                </a:effectLst>
+                <a:effectLst/>
                 <a:latin typeface="Arial" pitchFamily="34" charset="0"/>
                 <a:cs typeface="Arial" pitchFamily="34" charset="0"/>
               </a:rPr>
@@ -3610,15 +3473,11 @@
             <a:r>
               <a:rPr lang="nl-NL" sz="2600" dirty="0">
                 <a:solidFill>
-                  <a:schemeClr val="bg1"/>
+                  <a:schemeClr val="tx1">
+                    <a:lumMod val="95000"/>
+                  </a:schemeClr>
                 </a:solidFill>
-                <a:effectLst>
-                  <a:outerShdw blurRad="63500" dist="38100" algn="tl">
-                    <a:schemeClr val="bg1">
-                      <a:alpha val="70000"/>
-                    </a:schemeClr>
-                  </a:outerShdw>
-                </a:effectLst>
+                <a:effectLst/>
                 <a:latin typeface="Arial" pitchFamily="34" charset="0"/>
                 <a:cs typeface="Arial" pitchFamily="34" charset="0"/>
               </a:rPr>
@@ -3638,15 +3497,11 @@
             <a:r>
               <a:rPr lang="nl-NL" sz="2600" dirty="0">
                 <a:solidFill>
-                  <a:schemeClr val="bg1"/>
+                  <a:schemeClr val="tx1">
+                    <a:lumMod val="95000"/>
+                  </a:schemeClr>
                 </a:solidFill>
-                <a:effectLst>
-                  <a:outerShdw blurRad="63500" dist="38100" algn="tl">
-                    <a:schemeClr val="bg1">
-                      <a:alpha val="70000"/>
-                    </a:schemeClr>
-                  </a:outerShdw>
-                </a:effectLst>
+                <a:effectLst/>
                 <a:latin typeface="Arial" pitchFamily="34" charset="0"/>
                 <a:cs typeface="Arial" pitchFamily="34" charset="0"/>
               </a:rPr>
@@ -3666,15 +3521,11 @@
             <a:r>
               <a:rPr lang="nl-NL" sz="2600" dirty="0">
                 <a:solidFill>
-                  <a:schemeClr val="bg1"/>
+                  <a:schemeClr val="tx1">
+                    <a:lumMod val="95000"/>
+                  </a:schemeClr>
                 </a:solidFill>
-                <a:effectLst>
-                  <a:outerShdw blurRad="63500" dist="38100" algn="tl">
-                    <a:schemeClr val="bg1">
-                      <a:alpha val="70000"/>
-                    </a:schemeClr>
-                  </a:outerShdw>
-                </a:effectLst>
+                <a:effectLst/>
                 <a:latin typeface="Arial" pitchFamily="34" charset="0"/>
                 <a:cs typeface="Arial" pitchFamily="34" charset="0"/>
               </a:rPr>
@@ -3694,15 +3545,11 @@
             <a:r>
               <a:rPr lang="nl-NL" sz="2600" dirty="0">
                 <a:solidFill>
-                  <a:schemeClr val="bg1"/>
+                  <a:schemeClr val="tx1">
+                    <a:lumMod val="95000"/>
+                  </a:schemeClr>
                 </a:solidFill>
-                <a:effectLst>
-                  <a:outerShdw blurRad="63500" dist="38100" algn="tl">
-                    <a:schemeClr val="bg1">
-                      <a:alpha val="70000"/>
-                    </a:schemeClr>
-                  </a:outerShdw>
-                </a:effectLst>
+                <a:effectLst/>
                 <a:latin typeface="Arial" pitchFamily="34" charset="0"/>
                 <a:cs typeface="Arial" pitchFamily="34" charset="0"/>
               </a:rPr>
@@ -3721,15 +3568,11 @@
             </a:pPr>
             <a:endParaRPr lang="nl-NL" sz="2600" dirty="0">
               <a:solidFill>
-                <a:schemeClr val="bg1"/>
+                <a:schemeClr val="tx1">
+                  <a:lumMod val="95000"/>
+                </a:schemeClr>
               </a:solidFill>
-              <a:effectLst>
-                <a:outerShdw blurRad="63500" dist="38100" algn="tl">
-                  <a:schemeClr val="bg1">
-                    <a:alpha val="70000"/>
-                  </a:schemeClr>
-                </a:outerShdw>
-              </a:effectLst>
+              <a:effectLst/>
               <a:latin typeface="Arial" pitchFamily="34" charset="0"/>
               <a:cs typeface="Arial" pitchFamily="34" charset="0"/>
             </a:endParaRPr>
@@ -3745,51 +3588,39 @@
               <a:defRPr/>
             </a:pPr>
             <a:r>
-              <a:rPr lang="nl-NL" sz="2600">
+              <a:rPr lang="nl-NL" sz="2600" dirty="0">
                 <a:solidFill>
-                  <a:schemeClr val="bg1"/>
+                  <a:schemeClr val="tx1">
+                    <a:lumMod val="95000"/>
+                  </a:schemeClr>
                 </a:solidFill>
-                <a:effectLst>
-                  <a:outerShdw blurRad="63500" dist="38100" algn="tl">
-                    <a:schemeClr val="bg1">
-                      <a:alpha val="70000"/>
-                    </a:schemeClr>
-                  </a:outerShdw>
-                </a:effectLst>
+                <a:effectLst/>
                 <a:latin typeface="Arial" pitchFamily="34" charset="0"/>
                 <a:cs typeface="Arial" pitchFamily="34" charset="0"/>
               </a:rPr>
               <a:t>Wel </a:t>
             </a:r>
             <a:r>
-              <a:rPr lang="nl-NL" sz="2600" smtClean="0">
+              <a:rPr lang="nl-NL" sz="2600" dirty="0" smtClean="0">
                 <a:solidFill>
-                  <a:schemeClr val="bg1"/>
+                  <a:schemeClr val="tx1">
+                    <a:lumMod val="95000"/>
+                  </a:schemeClr>
                 </a:solidFill>
-                <a:effectLst>
-                  <a:outerShdw blurRad="63500" dist="38100" algn="tl">
-                    <a:schemeClr val="bg1">
-                      <a:alpha val="70000"/>
-                    </a:schemeClr>
-                  </a:outerShdw>
-                </a:effectLst>
+                <a:effectLst/>
                 <a:latin typeface="Arial" pitchFamily="34" charset="0"/>
                 <a:cs typeface="Arial" pitchFamily="34" charset="0"/>
               </a:rPr>
               <a:t>thuis</a:t>
             </a:r>
             <a:r>
-              <a:rPr lang="nl-NL" sz="2600" baseline="0" smtClean="0">
+              <a:rPr lang="nl-NL" sz="2600" baseline="0" dirty="0" smtClean="0">
                 <a:solidFill>
-                  <a:schemeClr val="bg1"/>
+                  <a:schemeClr val="tx1">
+                    <a:lumMod val="95000"/>
+                  </a:schemeClr>
                 </a:solidFill>
-                <a:effectLst>
-                  <a:outerShdw blurRad="63500" dist="38100" algn="tl">
-                    <a:schemeClr val="bg1">
-                      <a:alpha val="70000"/>
-                    </a:schemeClr>
-                  </a:outerShdw>
-                </a:effectLst>
+                <a:effectLst/>
                 <a:latin typeface="Arial" pitchFamily="34" charset="0"/>
                 <a:cs typeface="Arial" pitchFamily="34" charset="0"/>
               </a:rPr>
@@ -3797,15 +3628,11 @@
             </a:r>
             <a:endParaRPr lang="nl-NL" sz="2600" dirty="0">
               <a:solidFill>
-                <a:schemeClr val="bg1"/>
+                <a:schemeClr val="tx1">
+                  <a:lumMod val="95000"/>
+                </a:schemeClr>
               </a:solidFill>
-              <a:effectLst>
-                <a:outerShdw blurRad="63500" dist="38100" algn="tl">
-                  <a:schemeClr val="bg1">
-                    <a:alpha val="70000"/>
-                  </a:schemeClr>
-                </a:outerShdw>
-              </a:effectLst>
+              <a:effectLst/>
               <a:latin typeface="Arial" pitchFamily="34" charset="0"/>
               <a:cs typeface="Arial" pitchFamily="34" charset="0"/>
             </a:endParaRPr>
@@ -3954,39 +3781,33 @@
             </a:pPr>
             <a:r>
               <a:rPr lang="en-GB" sz="3000" dirty="0" err="1">
-                <a:effectLst>
-                  <a:outerShdw blurRad="63500" dist="38100" algn="ctr" rotWithShape="0">
-                    <a:schemeClr val="bg1">
-                      <a:alpha val="70000"/>
-                    </a:schemeClr>
-                  </a:outerShdw>
-                </a:effectLst>
+                <a:solidFill>
+                  <a:schemeClr val="tx1">
+                    <a:lumMod val="95000"/>
+                  </a:schemeClr>
+                </a:solidFill>
+                <a:effectLst/>
               </a:rPr>
               <a:t>Gezongen</a:t>
             </a:r>
             <a:r>
               <a:rPr lang="en-GB" sz="3000" dirty="0">
-                <a:effectLst>
-                  <a:outerShdw blurRad="63500" dist="38100" algn="ctr" rotWithShape="0">
-                    <a:schemeClr val="bg1">
-                      <a:alpha val="70000"/>
-                    </a:schemeClr>
-                  </a:outerShdw>
-                </a:effectLst>
+                <a:solidFill>
+                  <a:schemeClr val="tx1">
+                    <a:lumMod val="95000"/>
+                  </a:schemeClr>
+                </a:solidFill>
+                <a:effectLst/>
               </a:rPr>
               <a:t> Amen</a:t>
             </a:r>
             <a:endParaRPr lang="en-GB" sz="3000" dirty="0">
               <a:solidFill>
-                <a:schemeClr val="bg1"/>
+                <a:schemeClr val="tx1">
+                  <a:lumMod val="95000"/>
+                </a:schemeClr>
               </a:solidFill>
-              <a:effectLst>
-                <a:outerShdw blurRad="63500" dist="38100" algn="ctr" rotWithShape="0">
-                  <a:schemeClr val="bg1">
-                    <a:alpha val="70000"/>
-                  </a:schemeClr>
-                </a:outerShdw>
-              </a:effectLst>
+              <a:effectLst/>
               <a:ea typeface="+mj-ea"/>
               <a:cs typeface="Tahoma" pitchFamily="34" charset="0"/>
             </a:endParaRPr>
@@ -3998,7 +3819,14 @@
               </a:spcAft>
               <a:defRPr/>
             </a:pPr>
-            <a:endParaRPr lang="en-GB" sz="2800" dirty="0"/>
+            <a:endParaRPr lang="en-GB" sz="2800" dirty="0">
+              <a:solidFill>
+                <a:schemeClr val="tx1">
+                  <a:lumMod val="95000"/>
+                </a:schemeClr>
+              </a:solidFill>
+              <a:effectLst/>
+            </a:endParaRPr>
           </a:p>
         </p:txBody>
       </p:sp>
@@ -4517,37 +4345,34 @@
       </p:grpSpPr>
       <p:pic>
         <p:nvPicPr>
-          <p:cNvPr id="1026" name="Tijdelijke aanduiding voor inhoud 3" descr="1e pagina.jpg"/>
+          <p:cNvPr id="1026" name="Picture 2"/>
           <p:cNvPicPr>
-            <a:picLocks noGrp="1" noChangeAspect="1"/>
+            <a:picLocks noChangeAspect="1" noChangeArrowheads="1"/>
           </p:cNvPicPr>
-          <p:nvPr/>
+          <p:nvPr userDrawn="1"/>
         </p:nvPicPr>
         <p:blipFill>
-          <a:blip r:embed="rId23" cstate="print">
-            <a:extLst/>
-          </a:blip>
-          <a:srcRect l="50000" b="58519"/>
+          <a:blip r:embed="rId23" cstate="print"/>
+          <a:srcRect/>
           <a:stretch>
             <a:fillRect/>
           </a:stretch>
         </p:blipFill>
         <p:spPr bwMode="auto">
           <a:xfrm>
-            <a:off x="6372225" y="79375"/>
-            <a:ext cx="2700338" cy="1681163"/>
+            <a:off x="6359543" y="0"/>
+            <a:ext cx="2784456" cy="1573823"/>
           </a:xfrm>
           <a:prstGeom prst="rect">
             <a:avLst/>
           </a:prstGeom>
           <a:noFill/>
-          <a:ln>
+          <a:ln w="9525">
             <a:noFill/>
+            <a:miter lim="800000"/>
+            <a:headEnd/>
+            <a:tailEnd/>
           </a:ln>
-          <a:effectLst>
-            <a:softEdge rad="76200"/>
-          </a:effectLst>
-          <a:extLst/>
         </p:spPr>
       </p:pic>
     </p:spTree>
@@ -4988,7 +4813,7 @@
     </p:spTree>
     <p:extLst>
       <p:ext uri="{BB962C8B-B14F-4D97-AF65-F5344CB8AC3E}">
-        <p14:creationId xmlns="" xmlns:p14="http://schemas.microsoft.com/office/powerpoint/2010/main" val="1735715938"/>
+        <p14:creationId xmlns:p14="http://schemas.microsoft.com/office/powerpoint/2010/main" xmlns="" val="1735715938"/>
       </p:ext>
     </p:extLst>
   </p:cSld>

</xml_diff>